<commit_message>
no argument feature and powerpoint tweaks
</commit_message>
<xml_diff>
--- a/Projects/P1/doc/IART01.pptx
+++ b/Projects/P1/doc/IART01.pptx
@@ -5,7 +5,7 @@
     <p:sldMasterId id="2147483672" r:id="rId1"/>
   </p:sldMasterIdLst>
   <p:handoutMasterIdLst>
-    <p:handoutMasterId r:id="rId8"/>
+    <p:handoutMasterId r:id="rId7"/>
   </p:handoutMasterIdLst>
   <p:sldIdLst>
     <p:sldId id="261" r:id="rId2"/>
@@ -13,7 +13,6 @@
     <p:sldId id="258" r:id="rId4"/>
     <p:sldId id="259" r:id="rId5"/>
     <p:sldId id="260" r:id="rId6"/>
-    <p:sldId id="262" r:id="rId7"/>
   </p:sldIdLst>
   <p:sldSz cx="12192000" cy="6858000"/>
   <p:notesSz cx="6858000" cy="9144000"/>
@@ -217,7 +216,7 @@
           <a:p>
             <a:fld id="{3198FB46-316A-4315-9B41-C243CD40CDB0}" type="datetimeFigureOut">
               <a:rPr lang="pt-PT" smtClean="0"/>
-              <a:t>15/03/2020</a:t>
+              <a:t>16/03/2020</a:t>
             </a:fld>
             <a:endParaRPr lang="pt-PT"/>
           </a:p>
@@ -295,7 +294,7 @@
           <a:p>
             <a:fld id="{BC06498D-EC0A-4992-99AE-73C0AB70FC23}" type="slidenum">
               <a:rPr lang="pt-PT" smtClean="0"/>
-              <a:t>‹nº›</a:t>
+              <a:t>‹#›</a:t>
             </a:fld>
             <a:endParaRPr lang="pt-PT"/>
           </a:p>
@@ -538,7 +537,7 @@
           <a:p>
             <a:fld id="{E8A19EEC-21EA-4CAF-8095-9FB30FBE369D}" type="datetimeFigureOut">
               <a:rPr lang="en-US" smtClean="0"/>
-              <a:t>3/15/2020</a:t>
+              <a:t>16-Mar-20</a:t>
             </a:fld>
             <a:endParaRPr lang="en-US"/>
           </a:p>
@@ -580,7 +579,7 @@
           <a:p>
             <a:fld id="{BDFF435A-5B5D-48FB-B899-D92624692E5F}" type="slidenum">
               <a:rPr lang="en-US" smtClean="0"/>
-              <a:t>‹nº›</a:t>
+              <a:t>‹#›</a:t>
             </a:fld>
             <a:endParaRPr lang="en-US"/>
           </a:p>
@@ -746,7 +745,7 @@
           <a:p>
             <a:fld id="{E8A19EEC-21EA-4CAF-8095-9FB30FBE369D}" type="datetimeFigureOut">
               <a:rPr lang="en-US" smtClean="0"/>
-              <a:t>3/15/2020</a:t>
+              <a:t>16-Mar-20</a:t>
             </a:fld>
             <a:endParaRPr lang="en-US"/>
           </a:p>
@@ -788,7 +787,7 @@
           <a:p>
             <a:fld id="{BDFF435A-5B5D-48FB-B899-D92624692E5F}" type="slidenum">
               <a:rPr lang="en-US" smtClean="0"/>
-              <a:t>‹nº›</a:t>
+              <a:t>‹#›</a:t>
             </a:fld>
             <a:endParaRPr lang="en-US"/>
           </a:p>
@@ -1002,7 +1001,7 @@
           <a:p>
             <a:fld id="{E8A19EEC-21EA-4CAF-8095-9FB30FBE369D}" type="datetimeFigureOut">
               <a:rPr lang="en-US" smtClean="0"/>
-              <a:t>3/15/2020</a:t>
+              <a:t>16-Mar-20</a:t>
             </a:fld>
             <a:endParaRPr lang="en-US"/>
           </a:p>
@@ -1044,7 +1043,7 @@
           <a:p>
             <a:fld id="{BDFF435A-5B5D-48FB-B899-D92624692E5F}" type="slidenum">
               <a:rPr lang="en-US" smtClean="0"/>
-              <a:t>‹nº›</a:t>
+              <a:t>‹#›</a:t>
             </a:fld>
             <a:endParaRPr lang="en-US"/>
           </a:p>
@@ -1244,7 +1243,7 @@
           <a:p>
             <a:fld id="{BDFF435A-5B5D-48FB-B899-D92624692E5F}" type="slidenum">
               <a:rPr lang="en-US" smtClean="0"/>
-              <a:t>‹nº›</a:t>
+              <a:t>‹#›</a:t>
             </a:fld>
             <a:endParaRPr lang="en-US" dirty="0"/>
           </a:p>
@@ -1580,7 +1579,7 @@
           <a:p>
             <a:fld id="{E8A19EEC-21EA-4CAF-8095-9FB30FBE369D}" type="datetimeFigureOut">
               <a:rPr lang="en-US" smtClean="0"/>
-              <a:t>3/15/2020</a:t>
+              <a:t>16-Mar-20</a:t>
             </a:fld>
             <a:endParaRPr lang="en-US"/>
           </a:p>
@@ -1622,7 +1621,7 @@
           <a:p>
             <a:fld id="{BDFF435A-5B5D-48FB-B899-D92624692E5F}" type="slidenum">
               <a:rPr lang="en-US" smtClean="0"/>
-              <a:t>‹nº›</a:t>
+              <a:t>‹#›</a:t>
             </a:fld>
             <a:endParaRPr lang="en-US"/>
           </a:p>
@@ -1855,7 +1854,7 @@
           <a:p>
             <a:fld id="{E8A19EEC-21EA-4CAF-8095-9FB30FBE369D}" type="datetimeFigureOut">
               <a:rPr lang="en-US" smtClean="0"/>
-              <a:t>3/15/2020</a:t>
+              <a:t>16-Mar-20</a:t>
             </a:fld>
             <a:endParaRPr lang="en-US"/>
           </a:p>
@@ -1897,7 +1896,7 @@
           <a:p>
             <a:fld id="{BDFF435A-5B5D-48FB-B899-D92624692E5F}" type="slidenum">
               <a:rPr lang="en-US" smtClean="0"/>
-              <a:t>‹nº›</a:t>
+              <a:t>‹#›</a:t>
             </a:fld>
             <a:endParaRPr lang="en-US"/>
           </a:p>
@@ -2234,7 +2233,7 @@
           <a:p>
             <a:fld id="{E8A19EEC-21EA-4CAF-8095-9FB30FBE369D}" type="datetimeFigureOut">
               <a:rPr lang="en-US" smtClean="0"/>
-              <a:t>3/15/2020</a:t>
+              <a:t>16-Mar-20</a:t>
             </a:fld>
             <a:endParaRPr lang="en-US"/>
           </a:p>
@@ -2276,7 +2275,7 @@
           <a:p>
             <a:fld id="{BDFF435A-5B5D-48FB-B899-D92624692E5F}" type="slidenum">
               <a:rPr lang="en-US" smtClean="0"/>
-              <a:t>‹nº›</a:t>
+              <a:t>‹#›</a:t>
             </a:fld>
             <a:endParaRPr lang="en-US"/>
           </a:p>
@@ -2352,7 +2351,7 @@
           <a:p>
             <a:fld id="{E8A19EEC-21EA-4CAF-8095-9FB30FBE369D}" type="datetimeFigureOut">
               <a:rPr lang="en-US" smtClean="0"/>
-              <a:t>3/15/2020</a:t>
+              <a:t>16-Mar-20</a:t>
             </a:fld>
             <a:endParaRPr lang="en-US"/>
           </a:p>
@@ -2394,7 +2393,7 @@
           <a:p>
             <a:fld id="{BDFF435A-5B5D-48FB-B899-D92624692E5F}" type="slidenum">
               <a:rPr lang="en-US" smtClean="0"/>
-              <a:t>‹nº›</a:t>
+              <a:t>‹#›</a:t>
             </a:fld>
             <a:endParaRPr lang="en-US"/>
           </a:p>
@@ -2523,7 +2522,7 @@
           <a:p>
             <a:fld id="{E8A19EEC-21EA-4CAF-8095-9FB30FBE369D}" type="datetimeFigureOut">
               <a:rPr lang="en-US" smtClean="0"/>
-              <a:t>3/15/2020</a:t>
+              <a:t>16-Mar-20</a:t>
             </a:fld>
             <a:endParaRPr lang="en-US"/>
           </a:p>
@@ -2573,7 +2572,7 @@
           <a:p>
             <a:fld id="{BDFF435A-5B5D-48FB-B899-D92624692E5F}" type="slidenum">
               <a:rPr lang="en-US" smtClean="0"/>
-              <a:t>‹nº›</a:t>
+              <a:t>‹#›</a:t>
             </a:fld>
             <a:endParaRPr lang="en-US"/>
           </a:p>
@@ -2907,7 +2906,7 @@
           <a:p>
             <a:fld id="{BDFF435A-5B5D-48FB-B899-D92624692E5F}" type="slidenum">
               <a:rPr lang="en-US" smtClean="0"/>
-              <a:t>‹nº›</a:t>
+              <a:t>‹#›</a:t>
             </a:fld>
             <a:endParaRPr lang="en-US"/>
           </a:p>
@@ -3226,7 +3225,7 @@
           <a:p>
             <a:fld id="{E8A19EEC-21EA-4CAF-8095-9FB30FBE369D}" type="datetimeFigureOut">
               <a:rPr lang="en-US" smtClean="0"/>
-              <a:t>3/15/2020</a:t>
+              <a:t>16-Mar-20</a:t>
             </a:fld>
             <a:endParaRPr lang="en-US"/>
           </a:p>
@@ -3268,7 +3267,7 @@
           <a:p>
             <a:fld id="{BDFF435A-5B5D-48FB-B899-D92624692E5F}" type="slidenum">
               <a:rPr lang="en-US" smtClean="0"/>
-              <a:t>‹nº›</a:t>
+              <a:t>‹#›</a:t>
             </a:fld>
             <a:endParaRPr lang="en-US"/>
           </a:p>
@@ -3511,7 +3510,7 @@
           <a:p>
             <a:fld id="{E8A19EEC-21EA-4CAF-8095-9FB30FBE369D}" type="datetimeFigureOut">
               <a:rPr lang="en-US" smtClean="0"/>
-              <a:t>3/15/2020</a:t>
+              <a:t>16-Mar-20</a:t>
             </a:fld>
             <a:endParaRPr lang="en-US"/>
           </a:p>
@@ -3585,7 +3584,7 @@
           <a:p>
             <a:fld id="{BDFF435A-5B5D-48FB-B899-D92624692E5F}" type="slidenum">
               <a:rPr lang="en-US" smtClean="0"/>
-              <a:t>‹nº›</a:t>
+              <a:t>‹#›</a:t>
             </a:fld>
             <a:endParaRPr lang="en-US"/>
           </a:p>
@@ -4031,20 +4030,20 @@
               </a:spcAft>
             </a:pPr>
             <a:r>
-              <a:rPr lang="en-US" sz="4000" dirty="0"/>
+              <a:rPr lang="en-US" sz="4000" b="0" dirty="0"/>
               <a:t>Artificial Intelligence</a:t>
             </a:r>
             <a:br>
-              <a:rPr lang="en-US" sz="4000" dirty="0"/>
+              <a:rPr lang="en-US" sz="4000" b="0" dirty="0"/>
             </a:br>
             <a:br>
-              <a:rPr lang="en-US" sz="4000" dirty="0"/>
+              <a:rPr lang="en-US" sz="4000" b="0" dirty="0"/>
             </a:br>
             <a:r>
-              <a:rPr lang="en-US" sz="4000" dirty="0"/>
+              <a:rPr lang="en-US" sz="4000" b="0" dirty="0"/>
               <a:t>Self Driving Rides</a:t>
             </a:r>
-            <a:endParaRPr lang="pt-PT" sz="4000" dirty="0"/>
+            <a:endParaRPr lang="pt-PT" sz="4000" b="0" dirty="0"/>
           </a:p>
         </p:txBody>
       </p:sp>
@@ -4074,7 +4073,11 @@
           <a:bodyPr/>
           <a:lstStyle/>
           <a:p>
-            <a:pPr algn="just"/>
+            <a:pPr algn="just">
+              <a:spcAft>
+                <a:spcPts val="600"/>
+              </a:spcAft>
+            </a:pPr>
             <a:r>
               <a:rPr lang="en-US" sz="2800" b="1" dirty="0"/>
               <a:t>Project Goals</a:t>
@@ -4119,49 +4122,133 @@
         </p:nvSpPr>
         <p:spPr/>
         <p:txBody>
-          <a:bodyPr/>
+          <a:bodyPr>
+            <a:normAutofit lnSpcReduction="10000"/>
+          </a:bodyPr>
           <a:lstStyle/>
           <a:p>
-            <a:r>
-              <a:rPr lang="en-US" dirty="0"/>
+            <a:pPr algn="just">
+              <a:spcBef>
+                <a:spcPts val="0"/>
+              </a:spcBef>
+              <a:spcAft>
+                <a:spcPts val="0"/>
+              </a:spcAft>
+            </a:pPr>
+            <a:r>
+              <a:rPr lang="en-US" b="0" dirty="0"/>
+              <a:t>Checkpoint for AI Project 1</a:t>
+            </a:r>
+          </a:p>
+          <a:p>
+            <a:pPr algn="just">
+              <a:spcBef>
+                <a:spcPts val="0"/>
+              </a:spcBef>
+              <a:spcAft>
+                <a:spcPts val="0"/>
+              </a:spcAft>
+            </a:pPr>
+            <a:r>
+              <a:rPr lang="en-US" b="0" dirty="0"/>
               <a:t>March 2020</a:t>
             </a:r>
           </a:p>
           <a:p>
+            <a:pPr algn="just"/>
             <a:endParaRPr lang="en-US" dirty="0"/>
           </a:p>
           <a:p>
-            <a:pPr>
+            <a:pPr algn="just"/>
+            <a:endParaRPr lang="en-US" dirty="0"/>
+          </a:p>
+          <a:p>
+            <a:pPr algn="just"/>
+            <a:endParaRPr lang="en-US" dirty="0"/>
+          </a:p>
+          <a:p>
+            <a:pPr algn="just"/>
+            <a:endParaRPr lang="en-US" dirty="0"/>
+          </a:p>
+          <a:p>
+            <a:pPr algn="just"/>
+            <a:endParaRPr lang="en-US" dirty="0"/>
+          </a:p>
+          <a:p>
+            <a:pPr algn="just"/>
+            <a:endParaRPr lang="en-US" dirty="0"/>
+          </a:p>
+          <a:p>
+            <a:pPr algn="just">
               <a:spcBef>
                 <a:spcPts val="0"/>
               </a:spcBef>
             </a:pPr>
             <a:r>
               <a:rPr lang="en-US" dirty="0"/>
-              <a:t>Francisco</a:t>
-            </a:r>
-          </a:p>
-          <a:p>
-            <a:pPr>
+              <a:t>Francisco Gonçalves</a:t>
+            </a:r>
+          </a:p>
+          <a:p>
+            <a:pPr algn="just">
               <a:spcBef>
                 <a:spcPts val="0"/>
               </a:spcBef>
             </a:pPr>
             <a:r>
               <a:rPr lang="en-US" dirty="0"/>
-              <a:t>Luís </a:t>
-            </a:r>
-          </a:p>
-          <a:p>
-            <a:pPr>
+              <a:t>Luís Ramos </a:t>
+            </a:r>
+          </a:p>
+          <a:p>
+            <a:pPr algn="just">
               <a:spcBef>
                 <a:spcPts val="0"/>
               </a:spcBef>
             </a:pPr>
             <a:r>
               <a:rPr lang="en-US" dirty="0"/>
-              <a:t>Martim</a:t>
-            </a:r>
+              <a:t>Martim Silva</a:t>
+            </a:r>
+          </a:p>
+          <a:p>
+            <a:pPr algn="just">
+              <a:spcBef>
+                <a:spcPts val="0"/>
+              </a:spcBef>
+            </a:pPr>
+            <a:endParaRPr lang="en-US" dirty="0"/>
+          </a:p>
+          <a:p>
+            <a:pPr algn="just">
+              <a:spcBef>
+                <a:spcPts val="0"/>
+              </a:spcBef>
+            </a:pPr>
+            <a:endParaRPr lang="en-US" dirty="0"/>
+          </a:p>
+          <a:p>
+            <a:pPr algn="just">
+              <a:spcBef>
+                <a:spcPts val="0"/>
+              </a:spcBef>
+            </a:pPr>
+            <a:endParaRPr lang="en-US" dirty="0"/>
+          </a:p>
+          <a:p>
+            <a:pPr algn="just">
+              <a:spcBef>
+                <a:spcPts val="0"/>
+              </a:spcBef>
+            </a:pPr>
+            <a:endParaRPr lang="en-US" dirty="0"/>
+          </a:p>
+          <a:p>
+            <a:pPr algn="just">
+              <a:spcBef>
+                <a:spcPts val="0"/>
+              </a:spcBef>
+            </a:pPr>
             <a:endParaRPr lang="pt-PT" dirty="0"/>
           </a:p>
         </p:txBody>
@@ -5082,7 +5169,9 @@
           </a:xfrm>
         </p:spPr>
         <p:txBody>
-          <a:bodyPr/>
+          <a:bodyPr>
+            <a:normAutofit/>
+          </a:bodyPr>
           <a:lstStyle/>
           <a:p>
             <a:r>
@@ -5107,7 +5196,7 @@
         <p:spPr>
           <a:xfrm>
             <a:off x="525462" y="1203189"/>
-            <a:ext cx="6715387" cy="369332"/>
+            <a:ext cx="6715387" cy="338554"/>
           </a:xfrm>
           <a:prstGeom prst="rect">
             <a:avLst/>
@@ -5121,7 +5210,16 @@
           <a:lstStyle/>
           <a:p>
             <a:r>
-              <a:rPr lang="en-US" dirty="0"/>
+              <a:rPr lang="en-US" sz="1600" dirty="0">
+                <a:solidFill>
+                  <a:schemeClr val="bg2">
+                    <a:lumMod val="10000"/>
+                  </a:schemeClr>
+                </a:solidFill>
+                <a:highlight>
+                  <a:srgbClr val="C0C0C0"/>
+                </a:highlight>
+              </a:rPr>
               <a:t>Evaluation Function</a:t>
             </a:r>
           </a:p>
@@ -5151,49 +5249,14 @@
         </p:blipFill>
         <p:spPr>
           <a:xfrm>
-            <a:off x="525462" y="1768974"/>
-            <a:ext cx="7920697" cy="1660026"/>
+            <a:off x="610304" y="1534813"/>
+            <a:ext cx="7187930" cy="1506452"/>
           </a:xfrm>
           <a:prstGeom prst="rect">
             <a:avLst/>
           </a:prstGeom>
         </p:spPr>
       </p:pic>
-      <p:sp>
-        <p:nvSpPr>
-          <p:cNvPr id="9" name="CaixaDeTexto 8">
-            <a:extLst>
-              <a:ext uri="{FF2B5EF4-FFF2-40B4-BE49-F238E27FC236}">
-                <a16:creationId xmlns:a16="http://schemas.microsoft.com/office/drawing/2014/main" id="{686A86D3-1A60-4E0A-A777-4ADD83BCF7FD}"/>
-              </a:ext>
-            </a:extLst>
-          </p:cNvPr>
-          <p:cNvSpPr txBox="1"/>
-          <p:nvPr/>
-        </p:nvSpPr>
-        <p:spPr>
-          <a:xfrm>
-            <a:off x="525462" y="3782786"/>
-            <a:ext cx="8977767" cy="369332"/>
-          </a:xfrm>
-          <a:prstGeom prst="rect">
-            <a:avLst/>
-          </a:prstGeom>
-          <a:noFill/>
-        </p:spPr>
-        <p:txBody>
-          <a:bodyPr wrap="square" rtlCol="0">
-            <a:spAutoFit/>
-          </a:bodyPr>
-          <a:lstStyle/>
-          <a:p>
-            <a:r>
-              <a:rPr lang="pt-PT" dirty="0"/>
-              <a:t>Luís explica</a:t>
-            </a:r>
-          </a:p>
-        </p:txBody>
-      </p:sp>
       <p:pic>
         <p:nvPicPr>
           <p:cNvPr id="10" name="Imagem 9">
@@ -5216,8 +5279,8 @@
         </p:blipFill>
         <p:spPr>
           <a:xfrm>
-            <a:off x="3484573" y="4505904"/>
-            <a:ext cx="797161" cy="1742632"/>
+            <a:off x="6872143" y="3331729"/>
+            <a:ext cx="908690" cy="1986440"/>
           </a:xfrm>
           <a:prstGeom prst="rect">
             <a:avLst/>
@@ -5238,8 +5301,8 @@
         </p:nvSpPr>
         <p:spPr>
           <a:xfrm>
-            <a:off x="525461" y="4321238"/>
-            <a:ext cx="6715387" cy="369332"/>
+            <a:off x="525461" y="3187492"/>
+            <a:ext cx="6715387" cy="338554"/>
           </a:xfrm>
           <a:prstGeom prst="rect">
             <a:avLst/>
@@ -5253,9 +5316,49 @@
           <a:lstStyle/>
           <a:p>
             <a:r>
-              <a:rPr lang="en-US" dirty="0"/>
-              <a:t>Solution Representation</a:t>
-            </a:r>
+              <a:rPr lang="en-US" sz="1600" dirty="0">
+                <a:highlight>
+                  <a:srgbClr val="C0C0C0"/>
+                </a:highlight>
+              </a:rPr>
+              <a:t>Solution Representation:</a:t>
+            </a:r>
+          </a:p>
+        </p:txBody>
+      </p:sp>
+      <p:sp>
+        <p:nvSpPr>
+          <p:cNvPr id="4" name="TextBox 3">
+            <a:extLst>
+              <a:ext uri="{FF2B5EF4-FFF2-40B4-BE49-F238E27FC236}">
+                <a16:creationId xmlns:a16="http://schemas.microsoft.com/office/drawing/2014/main" id="{EB69CAFC-FB3A-4832-A358-EA68534ACC52}"/>
+              </a:ext>
+            </a:extLst>
+          </p:cNvPr>
+          <p:cNvSpPr txBox="1"/>
+          <p:nvPr/>
+        </p:nvSpPr>
+        <p:spPr>
+          <a:xfrm>
+            <a:off x="525461" y="3575537"/>
+            <a:ext cx="6082729" cy="307777"/>
+          </a:xfrm>
+          <a:prstGeom prst="rect">
+            <a:avLst/>
+          </a:prstGeom>
+          <a:noFill/>
+        </p:spPr>
+        <p:txBody>
+          <a:bodyPr wrap="square" rtlCol="0">
+            <a:spAutoFit/>
+          </a:bodyPr>
+          <a:lstStyle/>
+          <a:p>
+            <a:r>
+              <a:rPr lang="en-US" sz="1400" dirty="0"/>
+              <a:t>Explanation goes here</a:t>
+            </a:r>
+            <a:endParaRPr lang="pt-PT" sz="1400" dirty="0"/>
           </a:p>
         </p:txBody>
       </p:sp>
@@ -5338,83 +5441,306 @@
             <p:ph idx="1"/>
           </p:nvPr>
         </p:nvSpPr>
-        <p:spPr/>
-        <p:txBody>
-          <a:bodyPr/>
+        <p:spPr>
+          <a:xfrm>
+            <a:off x="161926" y="1038691"/>
+            <a:ext cx="11621580" cy="5220065"/>
+          </a:xfrm>
+        </p:spPr>
+        <p:txBody>
+          <a:bodyPr>
+            <a:normAutofit/>
+          </a:bodyPr>
           <a:lstStyle/>
           <a:p>
-            <a:r>
-              <a:rPr lang="en-150" noProof="0" dirty="0"/>
+            <a:pPr>
+              <a:spcBef>
+                <a:spcPts val="400"/>
+              </a:spcBef>
+              <a:spcAft>
+                <a:spcPts val="0"/>
+              </a:spcAft>
+            </a:pPr>
+            <a:r>
+              <a:rPr lang="en-150" sz="1400" noProof="0" dirty="0"/>
               <a:t>The project will be developed mostly in Python 3 with a possible visualization using JavaScript.</a:t>
             </a:r>
           </a:p>
           <a:p>
-            <a:r>
-              <a:rPr lang="en-150" noProof="0" dirty="0"/>
+            <a:pPr>
+              <a:spcBef>
+                <a:spcPts val="400"/>
+              </a:spcBef>
+            </a:pPr>
+            <a:r>
+              <a:rPr lang="en-150" sz="1400" noProof="0" dirty="0"/>
               <a:t>The development environment used by the group to develop the project is PyCharm by JetBrains.</a:t>
             </a:r>
           </a:p>
           <a:p>
-            <a:r>
-              <a:rPr lang="en-150" noProof="0" dirty="0"/>
-              <a:t>Data structures that will be most used are trees.</a:t>
-            </a:r>
-          </a:p>
-          <a:p>
-            <a:r>
-              <a:rPr lang="en-150" noProof="0" dirty="0"/>
+            <a:pPr>
+              <a:spcBef>
+                <a:spcPts val="400"/>
+              </a:spcBef>
+            </a:pPr>
+            <a:r>
+              <a:rPr lang="en-150" sz="1400" noProof="0" dirty="0"/>
+              <a:t>Data structures that will be used are trees</a:t>
+            </a:r>
+            <a:r>
+              <a:rPr lang="en-US" sz="1400" noProof="0" dirty="0"/>
+              <a:t> for the most part</a:t>
+            </a:r>
+            <a:r>
+              <a:rPr lang="en-150" sz="1400" noProof="0" dirty="0"/>
+              <a:t>.</a:t>
+            </a:r>
+            <a:r>
+              <a:rPr lang="en-US" sz="1400" noProof="0" dirty="0"/>
+              <a:t> </a:t>
+            </a:r>
+            <a:endParaRPr lang="en-150" sz="1400" noProof="0" dirty="0"/>
+          </a:p>
+          <a:p>
+            <a:pPr>
+              <a:spcBef>
+                <a:spcPts val="400"/>
+              </a:spcBef>
+              <a:spcAft>
+                <a:spcPts val="600"/>
+              </a:spcAft>
+            </a:pPr>
+            <a:r>
+              <a:rPr lang="en-150" sz="1400" noProof="0" dirty="0"/>
               <a:t>The project directory will follow this structure:</a:t>
             </a:r>
           </a:p>
           <a:p>
-            <a:pPr lvl="1"/>
-            <a:r>
-              <a:rPr lang="en-150" noProof="0" dirty="0"/>
-              <a:t>Doc: where all documents will be stored;</a:t>
-            </a:r>
-          </a:p>
-          <a:p>
-            <a:pPr lvl="1"/>
-            <a:r>
-              <a:rPr lang="en-150" noProof="0" dirty="0"/>
-              <a:t>Src: where the project’s source code is located;</a:t>
-            </a:r>
-          </a:p>
-          <a:p>
-            <a:pPr lvl="2"/>
-            <a:r>
-              <a:rPr lang="en-150" noProof="0" dirty="0"/>
-              <a:t>Assets: where code developed by others </a:t>
-            </a:r>
-            <a:r>
-              <a:rPr lang="pt-PT" noProof="0" dirty="0" err="1"/>
-              <a:t>and</a:t>
-            </a:r>
-            <a:r>
-              <a:rPr lang="pt-PT" noProof="0" dirty="0"/>
+            <a:pPr lvl="1">
+              <a:spcBef>
+                <a:spcPts val="400"/>
+              </a:spcBef>
+              <a:spcAft>
+                <a:spcPts val="0"/>
+              </a:spcAft>
+            </a:pPr>
+            <a:r>
+              <a:rPr lang="en-US" sz="1300" b="1" noProof="0" dirty="0"/>
+              <a:t>d</a:t>
+            </a:r>
+            <a:r>
+              <a:rPr lang="en-150" sz="1300" b="1" noProof="0" dirty="0"/>
+              <a:t>oc</a:t>
+            </a:r>
+            <a:r>
+              <a:rPr lang="en-150" sz="1300" noProof="0" dirty="0"/>
+              <a:t>: where all documents will be stored;</a:t>
+            </a:r>
+          </a:p>
+          <a:p>
+            <a:pPr lvl="1">
+              <a:spcBef>
+                <a:spcPts val="400"/>
+              </a:spcBef>
+              <a:spcAft>
+                <a:spcPts val="0"/>
+              </a:spcAft>
+            </a:pPr>
+            <a:r>
+              <a:rPr lang="en-US" sz="1300" b="1" noProof="0" dirty="0"/>
+              <a:t>s</a:t>
+            </a:r>
+            <a:r>
+              <a:rPr lang="en-150" sz="1300" b="1" noProof="0" dirty="0"/>
+              <a:t>rc</a:t>
+            </a:r>
+            <a:r>
+              <a:rPr lang="en-150" sz="1300" noProof="0" dirty="0"/>
+              <a:t>: where the project’s source code is located;</a:t>
+            </a:r>
+            <a:endParaRPr lang="en-US" sz="1300" noProof="0" dirty="0"/>
+          </a:p>
+          <a:p>
+            <a:pPr lvl="1">
+              <a:spcBef>
+                <a:spcPts val="400"/>
+              </a:spcBef>
+              <a:spcAft>
+                <a:spcPts val="0"/>
+              </a:spcAft>
+            </a:pPr>
+            <a:r>
+              <a:rPr lang="en-US" sz="1300" b="1" dirty="0"/>
+              <a:t>assets</a:t>
+            </a:r>
+            <a:r>
+              <a:rPr lang="en-150" sz="1300" dirty="0"/>
+              <a:t>: where code developed by others and</a:t>
+            </a:r>
+            <a:r>
+              <a:rPr lang="pt-PT" sz="1300" dirty="0"/>
               <a:t> </a:t>
             </a:r>
             <a:r>
-              <a:rPr lang="pt-PT" noProof="0" dirty="0" err="1"/>
+              <a:rPr lang="en-150" sz="1300" dirty="0"/>
               <a:t>the</a:t>
             </a:r>
             <a:r>
-              <a:rPr lang="pt-PT" noProof="0" dirty="0"/>
-              <a:t> Input </a:t>
-            </a:r>
-            <a:r>
-              <a:rPr lang="pt-PT" noProof="0" dirty="0" err="1"/>
+              <a:rPr lang="pt-PT" sz="1300" dirty="0"/>
+              <a:t> </a:t>
+            </a:r>
+            <a:r>
+              <a:rPr lang="pt-PT" sz="1300" b="1" dirty="0"/>
+              <a:t>input</a:t>
+            </a:r>
+            <a:r>
+              <a:rPr lang="pt-PT" sz="1300" dirty="0"/>
+              <a:t> </a:t>
+            </a:r>
+            <a:r>
+              <a:rPr lang="en-150" sz="1300" dirty="0"/>
               <a:t>is</a:t>
             </a:r>
             <a:r>
-              <a:rPr lang="pt-PT" noProof="0" dirty="0"/>
+              <a:rPr lang="pt-PT" sz="1300" dirty="0"/>
               <a:t> </a:t>
             </a:r>
             <a:r>
-              <a:rPr lang="pt-PT" noProof="0" dirty="0" err="1"/>
+              <a:rPr lang="en-150" sz="1300" dirty="0"/>
               <a:t>located</a:t>
             </a:r>
-            <a:endParaRPr lang="en-150" noProof="0" dirty="0"/>
+            <a:r>
+              <a:rPr lang="pt-PT" sz="1300" dirty="0"/>
+              <a:t> (5 </a:t>
+            </a:r>
+            <a:r>
+              <a:rPr lang="en-150" sz="1300" dirty="0"/>
+              <a:t>different</a:t>
+            </a:r>
+            <a:r>
+              <a:rPr lang="pt-PT" sz="1300" dirty="0"/>
+              <a:t> files).</a:t>
+            </a:r>
+            <a:endParaRPr lang="en-US" sz="1300" dirty="0"/>
+          </a:p>
+          <a:p>
+            <a:pPr marL="201168" lvl="1" indent="0">
+              <a:spcBef>
+                <a:spcPts val="400"/>
+              </a:spcBef>
+              <a:spcAft>
+                <a:spcPts val="0"/>
+              </a:spcAft>
+              <a:buNone/>
+            </a:pPr>
+            <a:endParaRPr lang="en-US" sz="700" noProof="0" dirty="0"/>
+          </a:p>
+          <a:p>
+            <a:pPr marL="201168" lvl="1" indent="0">
+              <a:spcBef>
+                <a:spcPts val="0"/>
+              </a:spcBef>
+              <a:spcAft>
+                <a:spcPts val="0"/>
+              </a:spcAft>
+              <a:buNone/>
+            </a:pPr>
+            <a:r>
+              <a:rPr lang="en-US" sz="1400" noProof="0" dirty="0"/>
+              <a:t>Each input file contains 6 integers in each line. The first line contains [</a:t>
+            </a:r>
+            <a:r>
+              <a:rPr lang="en-US" sz="1400" b="1" noProof="0" dirty="0"/>
+              <a:t>grid rows, grid columns, vehicles, rides, bonus per ride, steps</a:t>
+            </a:r>
+            <a:r>
+              <a:rPr lang="en-US" sz="1400" noProof="0" dirty="0"/>
+              <a:t>]. </a:t>
+            </a:r>
+          </a:p>
+          <a:p>
+            <a:pPr marL="201168" lvl="1" indent="0">
+              <a:spcBef>
+                <a:spcPts val="400"/>
+              </a:spcBef>
+              <a:buNone/>
+            </a:pPr>
+            <a:r>
+              <a:rPr lang="en-US" sz="1400" noProof="0" dirty="0"/>
+              <a:t>The second line contains [</a:t>
+            </a:r>
+            <a:r>
+              <a:rPr lang="en-US" sz="1400" b="1" noProof="0" dirty="0"/>
+              <a:t>(x1, y1), (x2, y2), earliest start, latest finish</a:t>
+            </a:r>
+            <a:r>
+              <a:rPr lang="en-US" sz="1400" noProof="0" dirty="0"/>
+              <a:t>].</a:t>
+            </a:r>
+          </a:p>
+          <a:p>
+            <a:pPr marL="201168" lvl="1" indent="0">
+              <a:spcBef>
+                <a:spcPts val="400"/>
+              </a:spcBef>
+              <a:buNone/>
+            </a:pPr>
+            <a:r>
+              <a:rPr lang="en-US" sz="1400" noProof="0" dirty="0"/>
+              <a:t>The greedy approach has already been implemented by the group.</a:t>
+            </a:r>
+          </a:p>
+          <a:p>
+            <a:pPr marL="201168" lvl="1" indent="0">
+              <a:spcBef>
+                <a:spcPts val="400"/>
+              </a:spcBef>
+              <a:buNone/>
+            </a:pPr>
+            <a:r>
+              <a:rPr lang="en-US" sz="1400" dirty="0"/>
+              <a:t>The program can be run </a:t>
+            </a:r>
+            <a:r>
+              <a:rPr lang="en-US" sz="1400" u="sng" dirty="0"/>
+              <a:t>with</a:t>
+            </a:r>
+            <a:r>
+              <a:rPr lang="en-US" sz="1400" dirty="0"/>
+              <a:t> or </a:t>
+            </a:r>
+            <a:r>
+              <a:rPr lang="en-US" sz="1400" u="sng" dirty="0"/>
+              <a:t>without</a:t>
+            </a:r>
+            <a:r>
+              <a:rPr lang="en-US" sz="1400" dirty="0"/>
+              <a:t> arguments. If the program is executed with an argument it should be the </a:t>
+            </a:r>
+            <a:r>
+              <a:rPr lang="en-US" sz="1400" u="sng" dirty="0"/>
+              <a:t>title</a:t>
+            </a:r>
+            <a:r>
+              <a:rPr lang="en-US" sz="1400" dirty="0"/>
+              <a:t> of an input (.in) file. If not, the program will test all 5 input files determining the sum of all 5 scores. 1</a:t>
+            </a:r>
+            <a:r>
+              <a:rPr lang="en-US" sz="1400" baseline="30000" dirty="0"/>
+              <a:t>st</a:t>
+            </a:r>
+            <a:r>
+              <a:rPr lang="en-US" sz="1400" dirty="0"/>
+              <a:t> and 2</a:t>
+            </a:r>
+            <a:r>
+              <a:rPr lang="en-US" sz="1400" baseline="30000" dirty="0"/>
+              <a:t>nd</a:t>
+            </a:r>
+            <a:r>
+              <a:rPr lang="en-US" sz="1400" dirty="0"/>
+              <a:t> files are almost instantly processed and as for the other 3 they all take around 4 and half minutes each (almost 14 minutes in total).</a:t>
+            </a:r>
           </a:p>
         </p:txBody>
       </p:sp>
@@ -5422,86 +5748,6 @@
     <p:extLst>
       <p:ext uri="{BB962C8B-B14F-4D97-AF65-F5344CB8AC3E}">
         <p14:creationId xmlns:p14="http://schemas.microsoft.com/office/powerpoint/2010/main" val="2168552250"/>
-      </p:ext>
-    </p:extLst>
-  </p:cSld>
-  <p:clrMapOvr>
-    <a:masterClrMapping/>
-  </p:clrMapOvr>
-</p:sld>
-</file>
-
-<file path=ppt/slides/slide6.xml><?xml version="1.0" encoding="utf-8"?>
-<p:sld xmlns:a="http://schemas.openxmlformats.org/drawingml/2006/main" xmlns:r="http://schemas.openxmlformats.org/officeDocument/2006/relationships" xmlns:p="http://schemas.openxmlformats.org/presentationml/2006/main">
-  <p:cSld>
-    <p:spTree>
-      <p:nvGrpSpPr>
-        <p:cNvPr id="1" name=""/>
-        <p:cNvGrpSpPr/>
-        <p:nvPr/>
-      </p:nvGrpSpPr>
-      <p:grpSpPr>
-        <a:xfrm>
-          <a:off x="0" y="0"/>
-          <a:ext cx="0" cy="0"/>
-          <a:chOff x="0" y="0"/>
-          <a:chExt cx="0" cy="0"/>
-        </a:xfrm>
-      </p:grpSpPr>
-      <p:sp>
-        <p:nvSpPr>
-          <p:cNvPr id="2" name="Título 1">
-            <a:extLst>
-              <a:ext uri="{FF2B5EF4-FFF2-40B4-BE49-F238E27FC236}">
-                <a16:creationId xmlns:a16="http://schemas.microsoft.com/office/drawing/2014/main" id="{E0A4E8DB-9FAE-4F5B-877C-858A4771447B}"/>
-              </a:ext>
-            </a:extLst>
-          </p:cNvPr>
-          <p:cNvSpPr>
-            <a:spLocks noGrp="1"/>
-          </p:cNvSpPr>
-          <p:nvPr>
-            <p:ph type="title"/>
-          </p:nvPr>
-        </p:nvSpPr>
-        <p:spPr/>
-        <p:txBody>
-          <a:bodyPr/>
-          <a:lstStyle/>
-          <a:p>
-            <a:endParaRPr lang="pt-PT" dirty="0"/>
-          </a:p>
-        </p:txBody>
-      </p:sp>
-      <p:sp>
-        <p:nvSpPr>
-          <p:cNvPr id="3" name="Marcador de Posição de Conteúdo 2">
-            <a:extLst>
-              <a:ext uri="{FF2B5EF4-FFF2-40B4-BE49-F238E27FC236}">
-                <a16:creationId xmlns:a16="http://schemas.microsoft.com/office/drawing/2014/main" id="{9FED855A-724A-4295-9ECE-AFDAA92E76E1}"/>
-              </a:ext>
-            </a:extLst>
-          </p:cNvPr>
-          <p:cNvSpPr>
-            <a:spLocks noGrp="1"/>
-          </p:cNvSpPr>
-          <p:nvPr>
-            <p:ph idx="1"/>
-          </p:nvPr>
-        </p:nvSpPr>
-        <p:spPr/>
-        <p:txBody>
-          <a:bodyPr/>
-          <a:lstStyle/>
-          <a:p>
-            <a:endParaRPr lang="pt-PT"/>
-          </a:p>
-        </p:txBody>
-      </p:sp>
-    </p:spTree>
-    <p:extLst>
-      <p:ext uri="{BB962C8B-B14F-4D97-AF65-F5344CB8AC3E}">
-        <p14:creationId xmlns:p14="http://schemas.microsoft.com/office/powerpoint/2010/main" val="268360594"/>
       </p:ext>
     </p:extLst>
   </p:cSld>

</xml_diff>

<commit_message>
final tweaks for checkpoint slides
</commit_message>
<xml_diff>
--- a/Projects/P1/doc/IART01.pptx
+++ b/Projects/P1/doc/IART01.pptx
@@ -4,8 +4,11 @@
   <p:sldMasterIdLst>
     <p:sldMasterId id="2147483672" r:id="rId1"/>
   </p:sldMasterIdLst>
+  <p:notesMasterIdLst>
+    <p:notesMasterId r:id="rId7"/>
+  </p:notesMasterIdLst>
   <p:handoutMasterIdLst>
-    <p:handoutMasterId r:id="rId7"/>
+    <p:handoutMasterId r:id="rId8"/>
   </p:handoutMasterIdLst>
   <p:sldIdLst>
     <p:sldId id="261" r:id="rId2"/>
@@ -309,6 +312,440 @@
   </p:cSld>
   <p:clrMap bg1="lt1" tx1="dk1" bg2="lt2" tx2="dk2" accent1="accent1" accent2="accent2" accent3="accent3" accent4="accent4" accent5="accent5" accent6="accent6" hlink="hlink" folHlink="folHlink"/>
 </p:handoutMaster>
+</file>
+
+<file path=ppt/notesMasters/notesMaster1.xml><?xml version="1.0" encoding="utf-8"?>
+<p:notesMaster xmlns:a="http://schemas.openxmlformats.org/drawingml/2006/main" xmlns:r="http://schemas.openxmlformats.org/officeDocument/2006/relationships" xmlns:p="http://schemas.openxmlformats.org/presentationml/2006/main">
+  <p:cSld>
+    <p:bg>
+      <p:bgRef idx="1001">
+        <a:schemeClr val="bg1"/>
+      </p:bgRef>
+    </p:bg>
+    <p:spTree>
+      <p:nvGrpSpPr>
+        <p:cNvPr id="1" name=""/>
+        <p:cNvGrpSpPr/>
+        <p:nvPr/>
+      </p:nvGrpSpPr>
+      <p:grpSpPr>
+        <a:xfrm>
+          <a:off x="0" y="0"/>
+          <a:ext cx="0" cy="0"/>
+          <a:chOff x="0" y="0"/>
+          <a:chExt cx="0" cy="0"/>
+        </a:xfrm>
+      </p:grpSpPr>
+      <p:sp>
+        <p:nvSpPr>
+          <p:cNvPr id="2" name="Header Placeholder 1"/>
+          <p:cNvSpPr>
+            <a:spLocks noGrp="1"/>
+          </p:cNvSpPr>
+          <p:nvPr>
+            <p:ph type="hdr" sz="quarter"/>
+          </p:nvPr>
+        </p:nvSpPr>
+        <p:spPr>
+          <a:xfrm>
+            <a:off x="0" y="0"/>
+            <a:ext cx="2971800" cy="458788"/>
+          </a:xfrm>
+          <a:prstGeom prst="rect">
+            <a:avLst/>
+          </a:prstGeom>
+        </p:spPr>
+        <p:txBody>
+          <a:bodyPr vert="horz" lIns="91440" tIns="45720" rIns="91440" bIns="45720" rtlCol="0"/>
+          <a:lstStyle>
+            <a:lvl1pPr algn="l">
+              <a:defRPr sz="1200"/>
+            </a:lvl1pPr>
+          </a:lstStyle>
+          <a:p>
+            <a:endParaRPr lang="pt-PT"/>
+          </a:p>
+        </p:txBody>
+      </p:sp>
+      <p:sp>
+        <p:nvSpPr>
+          <p:cNvPr id="3" name="Date Placeholder 2"/>
+          <p:cNvSpPr>
+            <a:spLocks noGrp="1"/>
+          </p:cNvSpPr>
+          <p:nvPr>
+            <p:ph type="dt" idx="1"/>
+          </p:nvPr>
+        </p:nvSpPr>
+        <p:spPr>
+          <a:xfrm>
+            <a:off x="3884613" y="0"/>
+            <a:ext cx="2971800" cy="458788"/>
+          </a:xfrm>
+          <a:prstGeom prst="rect">
+            <a:avLst/>
+          </a:prstGeom>
+        </p:spPr>
+        <p:txBody>
+          <a:bodyPr vert="horz" lIns="91440" tIns="45720" rIns="91440" bIns="45720" rtlCol="0"/>
+          <a:lstStyle>
+            <a:lvl1pPr algn="r">
+              <a:defRPr sz="1200"/>
+            </a:lvl1pPr>
+          </a:lstStyle>
+          <a:p>
+            <a:fld id="{150874B2-744E-447B-A26A-35965F8F185A}" type="datetimeFigureOut">
+              <a:rPr lang="pt-PT" smtClean="0"/>
+              <a:t>16/03/2020</a:t>
+            </a:fld>
+            <a:endParaRPr lang="pt-PT"/>
+          </a:p>
+        </p:txBody>
+      </p:sp>
+      <p:sp>
+        <p:nvSpPr>
+          <p:cNvPr id="4" name="Slide Image Placeholder 3"/>
+          <p:cNvSpPr>
+            <a:spLocks noGrp="1" noRot="1" noChangeAspect="1"/>
+          </p:cNvSpPr>
+          <p:nvPr>
+            <p:ph type="sldImg" idx="2"/>
+          </p:nvPr>
+        </p:nvSpPr>
+        <p:spPr>
+          <a:xfrm>
+            <a:off x="685800" y="1143000"/>
+            <a:ext cx="5486400" cy="3086100"/>
+          </a:xfrm>
+          <a:prstGeom prst="rect">
+            <a:avLst/>
+          </a:prstGeom>
+          <a:noFill/>
+          <a:ln w="12700">
+            <a:solidFill>
+              <a:prstClr val="black"/>
+            </a:solidFill>
+          </a:ln>
+        </p:spPr>
+        <p:txBody>
+          <a:bodyPr vert="horz" lIns="91440" tIns="45720" rIns="91440" bIns="45720" rtlCol="0" anchor="ctr"/>
+          <a:lstStyle/>
+          <a:p>
+            <a:endParaRPr lang="pt-PT"/>
+          </a:p>
+        </p:txBody>
+      </p:sp>
+      <p:sp>
+        <p:nvSpPr>
+          <p:cNvPr id="5" name="Notes Placeholder 4"/>
+          <p:cNvSpPr>
+            <a:spLocks noGrp="1"/>
+          </p:cNvSpPr>
+          <p:nvPr>
+            <p:ph type="body" sz="quarter" idx="3"/>
+          </p:nvPr>
+        </p:nvSpPr>
+        <p:spPr>
+          <a:xfrm>
+            <a:off x="685800" y="4400550"/>
+            <a:ext cx="5486400" cy="3600450"/>
+          </a:xfrm>
+          <a:prstGeom prst="rect">
+            <a:avLst/>
+          </a:prstGeom>
+        </p:spPr>
+        <p:txBody>
+          <a:bodyPr vert="horz" lIns="91440" tIns="45720" rIns="91440" bIns="45720" rtlCol="0"/>
+          <a:lstStyle/>
+          <a:p>
+            <a:pPr lvl="0"/>
+            <a:r>
+              <a:rPr lang="en-US"/>
+              <a:t>Click to edit Master text styles</a:t>
+            </a:r>
+          </a:p>
+          <a:p>
+            <a:pPr lvl="1"/>
+            <a:r>
+              <a:rPr lang="en-US"/>
+              <a:t>Second level</a:t>
+            </a:r>
+          </a:p>
+          <a:p>
+            <a:pPr lvl="2"/>
+            <a:r>
+              <a:rPr lang="en-US"/>
+              <a:t>Third level</a:t>
+            </a:r>
+          </a:p>
+          <a:p>
+            <a:pPr lvl="3"/>
+            <a:r>
+              <a:rPr lang="en-US"/>
+              <a:t>Fourth level</a:t>
+            </a:r>
+          </a:p>
+          <a:p>
+            <a:pPr lvl="4"/>
+            <a:r>
+              <a:rPr lang="en-US"/>
+              <a:t>Fifth level</a:t>
+            </a:r>
+            <a:endParaRPr lang="pt-PT"/>
+          </a:p>
+        </p:txBody>
+      </p:sp>
+      <p:sp>
+        <p:nvSpPr>
+          <p:cNvPr id="6" name="Footer Placeholder 5"/>
+          <p:cNvSpPr>
+            <a:spLocks noGrp="1"/>
+          </p:cNvSpPr>
+          <p:nvPr>
+            <p:ph type="ftr" sz="quarter" idx="4"/>
+          </p:nvPr>
+        </p:nvSpPr>
+        <p:spPr>
+          <a:xfrm>
+            <a:off x="0" y="8685213"/>
+            <a:ext cx="2971800" cy="458787"/>
+          </a:xfrm>
+          <a:prstGeom prst="rect">
+            <a:avLst/>
+          </a:prstGeom>
+        </p:spPr>
+        <p:txBody>
+          <a:bodyPr vert="horz" lIns="91440" tIns="45720" rIns="91440" bIns="45720" rtlCol="0" anchor="b"/>
+          <a:lstStyle>
+            <a:lvl1pPr algn="l">
+              <a:defRPr sz="1200"/>
+            </a:lvl1pPr>
+          </a:lstStyle>
+          <a:p>
+            <a:endParaRPr lang="pt-PT"/>
+          </a:p>
+        </p:txBody>
+      </p:sp>
+      <p:sp>
+        <p:nvSpPr>
+          <p:cNvPr id="7" name="Slide Number Placeholder 6"/>
+          <p:cNvSpPr>
+            <a:spLocks noGrp="1"/>
+          </p:cNvSpPr>
+          <p:nvPr>
+            <p:ph type="sldNum" sz="quarter" idx="5"/>
+          </p:nvPr>
+        </p:nvSpPr>
+        <p:spPr>
+          <a:xfrm>
+            <a:off x="3884613" y="8685213"/>
+            <a:ext cx="2971800" cy="458787"/>
+          </a:xfrm>
+          <a:prstGeom prst="rect">
+            <a:avLst/>
+          </a:prstGeom>
+        </p:spPr>
+        <p:txBody>
+          <a:bodyPr vert="horz" lIns="91440" tIns="45720" rIns="91440" bIns="45720" rtlCol="0" anchor="b"/>
+          <a:lstStyle>
+            <a:lvl1pPr algn="r">
+              <a:defRPr sz="1200"/>
+            </a:lvl1pPr>
+          </a:lstStyle>
+          <a:p>
+            <a:fld id="{50DE5D39-ABCD-4B0F-B87F-02B193BB2B1C}" type="slidenum">
+              <a:rPr lang="pt-PT" smtClean="0"/>
+              <a:t>‹#›</a:t>
+            </a:fld>
+            <a:endParaRPr lang="pt-PT"/>
+          </a:p>
+        </p:txBody>
+      </p:sp>
+    </p:spTree>
+    <p:extLst>
+      <p:ext uri="{BB962C8B-B14F-4D97-AF65-F5344CB8AC3E}">
+        <p14:creationId xmlns:p14="http://schemas.microsoft.com/office/powerpoint/2010/main" val="175160449"/>
+      </p:ext>
+    </p:extLst>
+  </p:cSld>
+  <p:clrMap bg1="lt1" tx1="dk1" bg2="lt2" tx2="dk2" accent1="accent1" accent2="accent2" accent3="accent3" accent4="accent4" accent5="accent5" accent6="accent6" hlink="hlink" folHlink="folHlink"/>
+  <p:notesStyle>
+    <a:lvl1pPr marL="0" algn="l" defTabSz="914400" rtl="0" eaLnBrk="1" latinLnBrk="0" hangingPunct="1">
+      <a:defRPr sz="1200" kern="1200">
+        <a:solidFill>
+          <a:schemeClr val="tx1"/>
+        </a:solidFill>
+        <a:latin typeface="+mn-lt"/>
+        <a:ea typeface="+mn-ea"/>
+        <a:cs typeface="+mn-cs"/>
+      </a:defRPr>
+    </a:lvl1pPr>
+    <a:lvl2pPr marL="457200" algn="l" defTabSz="914400" rtl="0" eaLnBrk="1" latinLnBrk="0" hangingPunct="1">
+      <a:defRPr sz="1200" kern="1200">
+        <a:solidFill>
+          <a:schemeClr val="tx1"/>
+        </a:solidFill>
+        <a:latin typeface="+mn-lt"/>
+        <a:ea typeface="+mn-ea"/>
+        <a:cs typeface="+mn-cs"/>
+      </a:defRPr>
+    </a:lvl2pPr>
+    <a:lvl3pPr marL="914400" algn="l" defTabSz="914400" rtl="0" eaLnBrk="1" latinLnBrk="0" hangingPunct="1">
+      <a:defRPr sz="1200" kern="1200">
+        <a:solidFill>
+          <a:schemeClr val="tx1"/>
+        </a:solidFill>
+        <a:latin typeface="+mn-lt"/>
+        <a:ea typeface="+mn-ea"/>
+        <a:cs typeface="+mn-cs"/>
+      </a:defRPr>
+    </a:lvl3pPr>
+    <a:lvl4pPr marL="1371600" algn="l" defTabSz="914400" rtl="0" eaLnBrk="1" latinLnBrk="0" hangingPunct="1">
+      <a:defRPr sz="1200" kern="1200">
+        <a:solidFill>
+          <a:schemeClr val="tx1"/>
+        </a:solidFill>
+        <a:latin typeface="+mn-lt"/>
+        <a:ea typeface="+mn-ea"/>
+        <a:cs typeface="+mn-cs"/>
+      </a:defRPr>
+    </a:lvl4pPr>
+    <a:lvl5pPr marL="1828800" algn="l" defTabSz="914400" rtl="0" eaLnBrk="1" latinLnBrk="0" hangingPunct="1">
+      <a:defRPr sz="1200" kern="1200">
+        <a:solidFill>
+          <a:schemeClr val="tx1"/>
+        </a:solidFill>
+        <a:latin typeface="+mn-lt"/>
+        <a:ea typeface="+mn-ea"/>
+        <a:cs typeface="+mn-cs"/>
+      </a:defRPr>
+    </a:lvl5pPr>
+    <a:lvl6pPr marL="2286000" algn="l" defTabSz="914400" rtl="0" eaLnBrk="1" latinLnBrk="0" hangingPunct="1">
+      <a:defRPr sz="1200" kern="1200">
+        <a:solidFill>
+          <a:schemeClr val="tx1"/>
+        </a:solidFill>
+        <a:latin typeface="+mn-lt"/>
+        <a:ea typeface="+mn-ea"/>
+        <a:cs typeface="+mn-cs"/>
+      </a:defRPr>
+    </a:lvl6pPr>
+    <a:lvl7pPr marL="2743200" algn="l" defTabSz="914400" rtl="0" eaLnBrk="1" latinLnBrk="0" hangingPunct="1">
+      <a:defRPr sz="1200" kern="1200">
+        <a:solidFill>
+          <a:schemeClr val="tx1"/>
+        </a:solidFill>
+        <a:latin typeface="+mn-lt"/>
+        <a:ea typeface="+mn-ea"/>
+        <a:cs typeface="+mn-cs"/>
+      </a:defRPr>
+    </a:lvl7pPr>
+    <a:lvl8pPr marL="3200400" algn="l" defTabSz="914400" rtl="0" eaLnBrk="1" latinLnBrk="0" hangingPunct="1">
+      <a:defRPr sz="1200" kern="1200">
+        <a:solidFill>
+          <a:schemeClr val="tx1"/>
+        </a:solidFill>
+        <a:latin typeface="+mn-lt"/>
+        <a:ea typeface="+mn-ea"/>
+        <a:cs typeface="+mn-cs"/>
+      </a:defRPr>
+    </a:lvl8pPr>
+    <a:lvl9pPr marL="3657600" algn="l" defTabSz="914400" rtl="0" eaLnBrk="1" latinLnBrk="0" hangingPunct="1">
+      <a:defRPr sz="1200" kern="1200">
+        <a:solidFill>
+          <a:schemeClr val="tx1"/>
+        </a:solidFill>
+        <a:latin typeface="+mn-lt"/>
+        <a:ea typeface="+mn-ea"/>
+        <a:cs typeface="+mn-cs"/>
+      </a:defRPr>
+    </a:lvl9pPr>
+  </p:notesStyle>
+</p:notesMaster>
+</file>
+
+<file path=ppt/notesSlides/notesSlide1.xml><?xml version="1.0" encoding="utf-8"?>
+<p:notes xmlns:a="http://schemas.openxmlformats.org/drawingml/2006/main" xmlns:r="http://schemas.openxmlformats.org/officeDocument/2006/relationships" xmlns:p="http://schemas.openxmlformats.org/presentationml/2006/main">
+  <p:cSld>
+    <p:spTree>
+      <p:nvGrpSpPr>
+        <p:cNvPr id="1" name=""/>
+        <p:cNvGrpSpPr/>
+        <p:nvPr/>
+      </p:nvGrpSpPr>
+      <p:grpSpPr>
+        <a:xfrm>
+          <a:off x="0" y="0"/>
+          <a:ext cx="0" cy="0"/>
+          <a:chOff x="0" y="0"/>
+          <a:chExt cx="0" cy="0"/>
+        </a:xfrm>
+      </p:grpSpPr>
+      <p:sp>
+        <p:nvSpPr>
+          <p:cNvPr id="2" name="Slide Image Placeholder 1"/>
+          <p:cNvSpPr>
+            <a:spLocks noGrp="1" noRot="1" noChangeAspect="1"/>
+          </p:cNvSpPr>
+          <p:nvPr>
+            <p:ph type="sldImg"/>
+          </p:nvPr>
+        </p:nvSpPr>
+        <p:spPr/>
+      </p:sp>
+      <p:sp>
+        <p:nvSpPr>
+          <p:cNvPr id="3" name="Notes Placeholder 2"/>
+          <p:cNvSpPr>
+            <a:spLocks noGrp="1"/>
+          </p:cNvSpPr>
+          <p:nvPr>
+            <p:ph type="body" idx="1"/>
+          </p:nvPr>
+        </p:nvSpPr>
+        <p:spPr/>
+        <p:txBody>
+          <a:bodyPr/>
+          <a:lstStyle/>
+          <a:p>
+            <a:endParaRPr lang="pt-PT"/>
+          </a:p>
+        </p:txBody>
+      </p:sp>
+      <p:sp>
+        <p:nvSpPr>
+          <p:cNvPr id="4" name="Slide Number Placeholder 3"/>
+          <p:cNvSpPr>
+            <a:spLocks noGrp="1"/>
+          </p:cNvSpPr>
+          <p:nvPr>
+            <p:ph type="sldNum" sz="quarter" idx="5"/>
+          </p:nvPr>
+        </p:nvSpPr>
+        <p:spPr/>
+        <p:txBody>
+          <a:bodyPr/>
+          <a:lstStyle/>
+          <a:p>
+            <a:fld id="{50DE5D39-ABCD-4B0F-B87F-02B193BB2B1C}" type="slidenum">
+              <a:rPr lang="pt-PT" smtClean="0"/>
+              <a:t>5</a:t>
+            </a:fld>
+            <a:endParaRPr lang="pt-PT"/>
+          </a:p>
+        </p:txBody>
+      </p:sp>
+    </p:spTree>
+    <p:extLst>
+      <p:ext uri="{BB962C8B-B14F-4D97-AF65-F5344CB8AC3E}">
+        <p14:creationId xmlns:p14="http://schemas.microsoft.com/office/powerpoint/2010/main" val="461473482"/>
+      </p:ext>
+    </p:extLst>
+  </p:cSld>
+  <p:clrMapOvr>
+    <a:masterClrMapping/>
+  </p:clrMapOvr>
+</p:notes>
 </file>
 
 <file path=ppt/slideLayouts/slideLayout1.xml><?xml version="1.0" encoding="utf-8"?>
@@ -5341,7 +5778,7 @@
         <p:spPr>
           <a:xfrm>
             <a:off x="525461" y="3575537"/>
-            <a:ext cx="6082729" cy="307777"/>
+            <a:ext cx="6082729" cy="1323439"/>
           </a:xfrm>
           <a:prstGeom prst="rect">
             <a:avLst/>
@@ -5354,11 +5791,44 @@
           </a:bodyPr>
           <a:lstStyle/>
           <a:p>
-            <a:r>
-              <a:rPr lang="en-US" sz="1400" dirty="0"/>
-              <a:t>Explanation goes here</a:t>
-            </a:r>
-            <a:endParaRPr lang="pt-PT" sz="1400" dirty="0"/>
+            <a:pPr algn="just"/>
+            <a:r>
+              <a:rPr lang="en-US" sz="1600" dirty="0"/>
+              <a:t>The solution is provided in an output file (.out). Each line corresponds to a vehicle. The first number (let’s call it </a:t>
+            </a:r>
+            <a:r>
+              <a:rPr lang="en-US" sz="1600" b="1" dirty="0"/>
+              <a:t>n</a:t>
+            </a:r>
+            <a:r>
+              <a:rPr lang="en-US" sz="1600" dirty="0"/>
+              <a:t>) is the amount of rides that have been assigned to each vehicle. After that there are </a:t>
+            </a:r>
+            <a:r>
+              <a:rPr lang="en-US" sz="1600" b="1" dirty="0"/>
+              <a:t>n</a:t>
+            </a:r>
+            <a:r>
+              <a:rPr lang="en-US" sz="1600" dirty="0"/>
+              <a:t> numbers and each represents the index of each assigned ride. On the right there is an example of output (first vehicle - first line - has </a:t>
+            </a:r>
+            <a:r>
+              <a:rPr lang="en-US" sz="1600" b="1" dirty="0"/>
+              <a:t>3</a:t>
+            </a:r>
+            <a:r>
+              <a:rPr lang="en-US" sz="1600" dirty="0"/>
+              <a:t> rides [</a:t>
+            </a:r>
+            <a:r>
+              <a:rPr lang="en-US" sz="1600" b="1" dirty="0"/>
+              <a:t>0, 277, 265</a:t>
+            </a:r>
+            <a:r>
+              <a:rPr lang="en-US" sz="1600" dirty="0"/>
+              <a:t>]).</a:t>
+            </a:r>
+            <a:endParaRPr lang="pt-PT" sz="1600" dirty="0"/>
           </a:p>
         </p:txBody>
       </p:sp>
@@ -5667,11 +6137,11 @@
             </a:pPr>
             <a:r>
               <a:rPr lang="en-US" sz="1400" noProof="0" dirty="0"/>
-              <a:t>The second line contains [</a:t>
+              <a:t>All the other lines contain [</a:t>
             </a:r>
             <a:r>
               <a:rPr lang="en-US" sz="1400" b="1" noProof="0" dirty="0"/>
-              <a:t>(x1, y1), (x2, y2), earliest start, latest finish</a:t>
+              <a:t>row1, column1, row2, column2, earliest start, latest finish</a:t>
             </a:r>
             <a:r>
               <a:rPr lang="en-US" sz="1400" noProof="0" dirty="0"/>
@@ -5687,7 +6157,15 @@
             </a:pPr>
             <a:r>
               <a:rPr lang="en-US" sz="1400" noProof="0" dirty="0"/>
-              <a:t>The greedy approach has already been implemented by the group.</a:t>
+              <a:t>The </a:t>
+            </a:r>
+            <a:r>
+              <a:rPr lang="en-US" sz="1400" b="1" noProof="0" dirty="0"/>
+              <a:t>greedy</a:t>
+            </a:r>
+            <a:r>
+              <a:rPr lang="en-US" sz="1400" noProof="0" dirty="0"/>
+              <a:t> approach has already been implemented by the group.</a:t>
             </a:r>
           </a:p>
           <a:p>
@@ -5742,8 +6220,59 @@
               <a:t> files are almost instantly processed and as for the other 3 they all take around 4 and half minutes each (almost 14 minutes in total).</a:t>
             </a:r>
           </a:p>
-        </p:txBody>
-      </p:sp>
+          <a:p>
+            <a:pPr marL="201168" lvl="1" indent="0">
+              <a:spcBef>
+                <a:spcPts val="400"/>
+              </a:spcBef>
+              <a:buNone/>
+            </a:pPr>
+            <a:endParaRPr lang="en-US" sz="1400" dirty="0"/>
+          </a:p>
+          <a:p>
+            <a:pPr marL="201168" lvl="1" indent="0">
+              <a:spcBef>
+                <a:spcPts val="400"/>
+              </a:spcBef>
+              <a:buNone/>
+            </a:pPr>
+            <a:r>
+              <a:rPr lang="en-US" sz="1400" dirty="0"/>
+              <a:t>The console will show the details of every ride and when it’s done it will show the score for the input file (using the evaluation function)</a:t>
+            </a:r>
+          </a:p>
+        </p:txBody>
+      </p:sp>
+      <p:pic>
+        <p:nvPicPr>
+          <p:cNvPr id="4" name="Picture 3">
+            <a:extLst>
+              <a:ext uri="{FF2B5EF4-FFF2-40B4-BE49-F238E27FC236}">
+                <a16:creationId xmlns:a16="http://schemas.microsoft.com/office/drawing/2014/main" id="{1123E172-B1E0-49BF-A1D4-4E3462D0CBFF}"/>
+              </a:ext>
+            </a:extLst>
+          </p:cNvPr>
+          <p:cNvPicPr>
+            <a:picLocks noChangeAspect="1"/>
+          </p:cNvPicPr>
+          <p:nvPr/>
+        </p:nvPicPr>
+        <p:blipFill>
+          <a:blip r:embed="rId3"/>
+          <a:stretch>
+            <a:fillRect/>
+          </a:stretch>
+        </p:blipFill>
+        <p:spPr>
+          <a:xfrm>
+            <a:off x="408494" y="5033737"/>
+            <a:ext cx="2790537" cy="873560"/>
+          </a:xfrm>
+          <a:prstGeom prst="rect">
+            <a:avLst/>
+          </a:prstGeom>
+        </p:spPr>
+      </p:pic>
     </p:spTree>
     <p:extLst>
       <p:ext uri="{BB962C8B-B14F-4D97-AF65-F5344CB8AC3E}">
@@ -6333,4 +6862,299 @@
     </a:ext>
   </a:extLst>
 </a:theme>
+</file>
+
+<file path=ppt/theme/theme3.xml><?xml version="1.0" encoding="utf-8"?>
+<a:theme xmlns:a="http://schemas.openxmlformats.org/drawingml/2006/main" name="Office Theme">
+  <a:themeElements>
+    <a:clrScheme name="Office">
+      <a:dk1>
+        <a:sysClr val="windowText" lastClr="000000"/>
+      </a:dk1>
+      <a:lt1>
+        <a:sysClr val="window" lastClr="FFFFFF"/>
+      </a:lt1>
+      <a:dk2>
+        <a:srgbClr val="44546A"/>
+      </a:dk2>
+      <a:lt2>
+        <a:srgbClr val="E7E6E6"/>
+      </a:lt2>
+      <a:accent1>
+        <a:srgbClr val="4472C4"/>
+      </a:accent1>
+      <a:accent2>
+        <a:srgbClr val="ED7D31"/>
+      </a:accent2>
+      <a:accent3>
+        <a:srgbClr val="A5A5A5"/>
+      </a:accent3>
+      <a:accent4>
+        <a:srgbClr val="FFC000"/>
+      </a:accent4>
+      <a:accent5>
+        <a:srgbClr val="5B9BD5"/>
+      </a:accent5>
+      <a:accent6>
+        <a:srgbClr val="70AD47"/>
+      </a:accent6>
+      <a:hlink>
+        <a:srgbClr val="0563C1"/>
+      </a:hlink>
+      <a:folHlink>
+        <a:srgbClr val="954F72"/>
+      </a:folHlink>
+    </a:clrScheme>
+    <a:fontScheme name="Office">
+      <a:majorFont>
+        <a:latin typeface="Calibri Light" panose="020F0302020204030204"/>
+        <a:ea typeface=""/>
+        <a:cs typeface=""/>
+        <a:font script="Jpan" typeface="游ゴシック Light"/>
+        <a:font script="Hang" typeface="맑은 고딕"/>
+        <a:font script="Hans" typeface="等线 Light"/>
+        <a:font script="Hant" typeface="新細明體"/>
+        <a:font script="Arab" typeface="Times New Roman"/>
+        <a:font script="Hebr" typeface="Times New Roman"/>
+        <a:font script="Thai" typeface="Angsana New"/>
+        <a:font script="Ethi" typeface="Nyala"/>
+        <a:font script="Beng" typeface="Vrinda"/>
+        <a:font script="Gujr" typeface="Shruti"/>
+        <a:font script="Khmr" typeface="MoolBoran"/>
+        <a:font script="Knda" typeface="Tunga"/>
+        <a:font script="Guru" typeface="Raavi"/>
+        <a:font script="Cans" typeface="Euphemia"/>
+        <a:font script="Cher" typeface="Plantagenet Cherokee"/>
+        <a:font script="Yiii" typeface="Microsoft Yi Baiti"/>
+        <a:font script="Tibt" typeface="Microsoft Himalaya"/>
+        <a:font script="Thaa" typeface="MV Boli"/>
+        <a:font script="Deva" typeface="Mangal"/>
+        <a:font script="Telu" typeface="Gautami"/>
+        <a:font script="Taml" typeface="Latha"/>
+        <a:font script="Syrc" typeface="Estrangelo Edessa"/>
+        <a:font script="Orya" typeface="Kalinga"/>
+        <a:font script="Mlym" typeface="Kartika"/>
+        <a:font script="Laoo" typeface="DokChampa"/>
+        <a:font script="Sinh" typeface="Iskoola Pota"/>
+        <a:font script="Mong" typeface="Mongolian Baiti"/>
+        <a:font script="Viet" typeface="Times New Roman"/>
+        <a:font script="Uigh" typeface="Microsoft Uighur"/>
+        <a:font script="Geor" typeface="Sylfaen"/>
+        <a:font script="Armn" typeface="Arial"/>
+        <a:font script="Bugi" typeface="Leelawadee UI"/>
+        <a:font script="Bopo" typeface="Microsoft JhengHei"/>
+        <a:font script="Java" typeface="Javanese Text"/>
+        <a:font script="Lisu" typeface="Segoe UI"/>
+        <a:font script="Mymr" typeface="Myanmar Text"/>
+        <a:font script="Nkoo" typeface="Ebrima"/>
+        <a:font script="Olck" typeface="Nirmala UI"/>
+        <a:font script="Osma" typeface="Ebrima"/>
+        <a:font script="Phag" typeface="Phagspa"/>
+        <a:font script="Syrn" typeface="Estrangelo Edessa"/>
+        <a:font script="Syrj" typeface="Estrangelo Edessa"/>
+        <a:font script="Syre" typeface="Estrangelo Edessa"/>
+        <a:font script="Sora" typeface="Nirmala UI"/>
+        <a:font script="Tale" typeface="Microsoft Tai Le"/>
+        <a:font script="Talu" typeface="Microsoft New Tai Lue"/>
+        <a:font script="Tfng" typeface="Ebrima"/>
+      </a:majorFont>
+      <a:minorFont>
+        <a:latin typeface="Calibri" panose="020F0502020204030204"/>
+        <a:ea typeface=""/>
+        <a:cs typeface=""/>
+        <a:font script="Jpan" typeface="游ゴシック"/>
+        <a:font script="Hang" typeface="맑은 고딕"/>
+        <a:font script="Hans" typeface="等线"/>
+        <a:font script="Hant" typeface="新細明體"/>
+        <a:font script="Arab" typeface="Arial"/>
+        <a:font script="Hebr" typeface="Arial"/>
+        <a:font script="Thai" typeface="Cordia New"/>
+        <a:font script="Ethi" typeface="Nyala"/>
+        <a:font script="Beng" typeface="Vrinda"/>
+        <a:font script="Gujr" typeface="Shruti"/>
+        <a:font script="Khmr" typeface="DaunPenh"/>
+        <a:font script="Knda" typeface="Tunga"/>
+        <a:font script="Guru" typeface="Raavi"/>
+        <a:font script="Cans" typeface="Euphemia"/>
+        <a:font script="Cher" typeface="Plantagenet Cherokee"/>
+        <a:font script="Yiii" typeface="Microsoft Yi Baiti"/>
+        <a:font script="Tibt" typeface="Microsoft Himalaya"/>
+        <a:font script="Thaa" typeface="MV Boli"/>
+        <a:font script="Deva" typeface="Mangal"/>
+        <a:font script="Telu" typeface="Gautami"/>
+        <a:font script="Taml" typeface="Latha"/>
+        <a:font script="Syrc" typeface="Estrangelo Edessa"/>
+        <a:font script="Orya" typeface="Kalinga"/>
+        <a:font script="Mlym" typeface="Kartika"/>
+        <a:font script="Laoo" typeface="DokChampa"/>
+        <a:font script="Sinh" typeface="Iskoola Pota"/>
+        <a:font script="Mong" typeface="Mongolian Baiti"/>
+        <a:font script="Viet" typeface="Arial"/>
+        <a:font script="Uigh" typeface="Microsoft Uighur"/>
+        <a:font script="Geor" typeface="Sylfaen"/>
+        <a:font script="Armn" typeface="Arial"/>
+        <a:font script="Bugi" typeface="Leelawadee UI"/>
+        <a:font script="Bopo" typeface="Microsoft JhengHei"/>
+        <a:font script="Java" typeface="Javanese Text"/>
+        <a:font script="Lisu" typeface="Segoe UI"/>
+        <a:font script="Mymr" typeface="Myanmar Text"/>
+        <a:font script="Nkoo" typeface="Ebrima"/>
+        <a:font script="Olck" typeface="Nirmala UI"/>
+        <a:font script="Osma" typeface="Ebrima"/>
+        <a:font script="Phag" typeface="Phagspa"/>
+        <a:font script="Syrn" typeface="Estrangelo Edessa"/>
+        <a:font script="Syrj" typeface="Estrangelo Edessa"/>
+        <a:font script="Syre" typeface="Estrangelo Edessa"/>
+        <a:font script="Sora" typeface="Nirmala UI"/>
+        <a:font script="Tale" typeface="Microsoft Tai Le"/>
+        <a:font script="Talu" typeface="Microsoft New Tai Lue"/>
+        <a:font script="Tfng" typeface="Ebrima"/>
+      </a:minorFont>
+    </a:fontScheme>
+    <a:fmtScheme name="Office">
+      <a:fillStyleLst>
+        <a:solidFill>
+          <a:schemeClr val="phClr"/>
+        </a:solidFill>
+        <a:gradFill rotWithShape="1">
+          <a:gsLst>
+            <a:gs pos="0">
+              <a:schemeClr val="phClr">
+                <a:lumMod val="110000"/>
+                <a:satMod val="105000"/>
+                <a:tint val="67000"/>
+              </a:schemeClr>
+            </a:gs>
+            <a:gs pos="50000">
+              <a:schemeClr val="phClr">
+                <a:lumMod val="105000"/>
+                <a:satMod val="103000"/>
+                <a:tint val="73000"/>
+              </a:schemeClr>
+            </a:gs>
+            <a:gs pos="100000">
+              <a:schemeClr val="phClr">
+                <a:lumMod val="105000"/>
+                <a:satMod val="109000"/>
+                <a:tint val="81000"/>
+              </a:schemeClr>
+            </a:gs>
+          </a:gsLst>
+          <a:lin ang="5400000" scaled="0"/>
+        </a:gradFill>
+        <a:gradFill rotWithShape="1">
+          <a:gsLst>
+            <a:gs pos="0">
+              <a:schemeClr val="phClr">
+                <a:satMod val="103000"/>
+                <a:lumMod val="102000"/>
+                <a:tint val="94000"/>
+              </a:schemeClr>
+            </a:gs>
+            <a:gs pos="50000">
+              <a:schemeClr val="phClr">
+                <a:satMod val="110000"/>
+                <a:lumMod val="100000"/>
+                <a:shade val="100000"/>
+              </a:schemeClr>
+            </a:gs>
+            <a:gs pos="100000">
+              <a:schemeClr val="phClr">
+                <a:lumMod val="99000"/>
+                <a:satMod val="120000"/>
+                <a:shade val="78000"/>
+              </a:schemeClr>
+            </a:gs>
+          </a:gsLst>
+          <a:lin ang="5400000" scaled="0"/>
+        </a:gradFill>
+      </a:fillStyleLst>
+      <a:lnStyleLst>
+        <a:ln w="6350" cap="flat" cmpd="sng" algn="ctr">
+          <a:solidFill>
+            <a:schemeClr val="phClr"/>
+          </a:solidFill>
+          <a:prstDash val="solid"/>
+          <a:miter lim="800000"/>
+        </a:ln>
+        <a:ln w="12700" cap="flat" cmpd="sng" algn="ctr">
+          <a:solidFill>
+            <a:schemeClr val="phClr"/>
+          </a:solidFill>
+          <a:prstDash val="solid"/>
+          <a:miter lim="800000"/>
+        </a:ln>
+        <a:ln w="19050" cap="flat" cmpd="sng" algn="ctr">
+          <a:solidFill>
+            <a:schemeClr val="phClr"/>
+          </a:solidFill>
+          <a:prstDash val="solid"/>
+          <a:miter lim="800000"/>
+        </a:ln>
+      </a:lnStyleLst>
+      <a:effectStyleLst>
+        <a:effectStyle>
+          <a:effectLst/>
+        </a:effectStyle>
+        <a:effectStyle>
+          <a:effectLst/>
+        </a:effectStyle>
+        <a:effectStyle>
+          <a:effectLst>
+            <a:outerShdw blurRad="57150" dist="19050" dir="5400000" algn="ctr" rotWithShape="0">
+              <a:srgbClr val="000000">
+                <a:alpha val="63000"/>
+              </a:srgbClr>
+            </a:outerShdw>
+          </a:effectLst>
+        </a:effectStyle>
+      </a:effectStyleLst>
+      <a:bgFillStyleLst>
+        <a:solidFill>
+          <a:schemeClr val="phClr"/>
+        </a:solidFill>
+        <a:solidFill>
+          <a:schemeClr val="phClr">
+            <a:tint val="95000"/>
+            <a:satMod val="170000"/>
+          </a:schemeClr>
+        </a:solidFill>
+        <a:gradFill rotWithShape="1">
+          <a:gsLst>
+            <a:gs pos="0">
+              <a:schemeClr val="phClr">
+                <a:tint val="93000"/>
+                <a:satMod val="150000"/>
+                <a:shade val="98000"/>
+                <a:lumMod val="102000"/>
+              </a:schemeClr>
+            </a:gs>
+            <a:gs pos="50000">
+              <a:schemeClr val="phClr">
+                <a:tint val="98000"/>
+                <a:satMod val="130000"/>
+                <a:shade val="90000"/>
+                <a:lumMod val="103000"/>
+              </a:schemeClr>
+            </a:gs>
+            <a:gs pos="100000">
+              <a:schemeClr val="phClr">
+                <a:shade val="63000"/>
+                <a:satMod val="120000"/>
+              </a:schemeClr>
+            </a:gs>
+          </a:gsLst>
+          <a:lin ang="5400000" scaled="0"/>
+        </a:gradFill>
+      </a:bgFillStyleLst>
+    </a:fmtScheme>
+  </a:themeElements>
+  <a:objectDefaults/>
+  <a:extraClrSchemeLst/>
+  <a:extLst>
+    <a:ext uri="{05A4C25C-085E-4340-85A3-A5531E510DB2}">
+      <thm15:themeFamily xmlns:thm15="http://schemas.microsoft.com/office/thememl/2012/main" name="Office Theme" id="{62F939B6-93AF-4DB8-9C6B-D6C7DFDC589F}" vid="{4A3C46E8-61CC-4603-A589-7422A47A8E4A}"/>
+    </a:ext>
+  </a:extLst>
+</a:theme>
 </file>
</xml_diff>